<commit_message>
update Review 1 ppt
</commit_message>
<xml_diff>
--- a/Review/Review 1/19C0-59,62,77 Review1 (18CS810) - incomplete.pptx
+++ b/Review/Review 1/19C0-59,62,77 Review1 (18CS810) - incomplete.pptx
@@ -3842,8 +3842,8 @@
         </p:nvSpPr>
         <p:spPr>
           <a:xfrm>
-            <a:off x="317500" y="4249"/>
-            <a:ext cx="8510700" cy="1143001"/>
+            <a:off x="2438400" y="4249"/>
+            <a:ext cx="4254500" cy="1143001"/>
           </a:xfrm>
           <a:prstGeom prst="rect">
             <a:avLst/>
@@ -3958,16 +3958,16 @@
       </p:sp>
       <p:sp>
         <p:nvSpPr>
-          <p:cNvPr id="180" name="Double-click to edit"/>
+          <p:cNvPr id="180" name="Designing Phase (Circuit &amp; Connections)…"/>
           <p:cNvSpPr txBox="1"/>
           <p:nvPr>
-            <p:ph type="body" idx="1"/>
+            <p:ph type="body" sz="half" idx="1"/>
           </p:nvPr>
         </p:nvSpPr>
         <p:spPr>
           <a:xfrm>
             <a:off x="457200" y="1016000"/>
-            <a:ext cx="8229600" cy="5054600"/>
+            <a:ext cx="8229600" cy="2044700"/>
           </a:xfrm>
           <a:prstGeom prst="rect">
             <a:avLst/>
@@ -3988,6 +3988,170 @@
                 <a:sym typeface="Cambria"/>
               </a:defRPr>
             </a:pPr>
+            <a:r>
+              <a:t>Designing Phase (Circuit &amp; Connections)</a:t>
+            </a:r>
+          </a:p>
+          <a:p>
+            <a:pPr marL="210552" indent="-210552" algn="just">
+              <a:buClrTx/>
+              <a:buSzPct val="100000"/>
+              <a:buFontTx/>
+              <a:defRPr sz="2100">
+                <a:latin typeface="Cambria"/>
+                <a:ea typeface="Cambria"/>
+                <a:cs typeface="Cambria"/>
+                <a:sym typeface="Cambria"/>
+              </a:defRPr>
+            </a:pPr>
+            <a:r>
+              <a:t>Machine Learning Model</a:t>
+            </a:r>
+          </a:p>
+          <a:p>
+            <a:pPr marL="210552" indent="-210552" algn="just">
+              <a:buClrTx/>
+              <a:buSzPct val="100000"/>
+              <a:buFontTx/>
+              <a:defRPr sz="2100">
+                <a:latin typeface="Cambria"/>
+                <a:ea typeface="Cambria"/>
+                <a:cs typeface="Cambria"/>
+                <a:sym typeface="Cambria"/>
+              </a:defRPr>
+            </a:pPr>
+            <a:r>
+              <a:t>Frontend</a:t>
+            </a:r>
+          </a:p>
+        </p:txBody>
+      </p:sp>
+      <p:sp>
+        <p:nvSpPr>
+          <p:cNvPr id="181" name="Work to be Done"/>
+          <p:cNvSpPr txBox="1"/>
+          <p:nvPr/>
+        </p:nvSpPr>
+        <p:spPr>
+          <a:xfrm>
+            <a:off x="2438400" y="3060700"/>
+            <a:ext cx="4254500" cy="1143000"/>
+          </a:xfrm>
+          <a:prstGeom prst="rect">
+            <a:avLst/>
+          </a:prstGeom>
+          <a:ln w="12700">
+            <a:miter lim="400000"/>
+          </a:ln>
+          <a:extLst>
+            <a:ext uri="{C572A759-6A51-4108-AA02-DFA0A04FC94B}">
+              <ma14:wrappingTextBoxFlag xmlns:ma14="http://schemas.microsoft.com/office/mac/drawingml/2011/main" val="1"/>
+            </a:ext>
+          </a:extLst>
+        </p:spPr>
+        <p:txBody>
+          <a:bodyPr lIns="45699" tIns="45699" rIns="45699" bIns="45699" anchor="ctr">
+            <a:normAutofit fontScale="100000" lnSpcReduction="0"/>
+          </a:bodyPr>
+          <a:lstStyle>
+            <a:lvl1pPr algn="ctr">
+              <a:defRPr cap="small" sz="4400">
+                <a:latin typeface="Cambria"/>
+                <a:ea typeface="Cambria"/>
+                <a:cs typeface="Cambria"/>
+                <a:sym typeface="Cambria"/>
+              </a:defRPr>
+            </a:lvl1pPr>
+          </a:lstStyle>
+          <a:p>
+            <a:pPr/>
+            <a:r>
+              <a:t>Work to be Done</a:t>
+            </a:r>
+          </a:p>
+        </p:txBody>
+      </p:sp>
+      <p:sp>
+        <p:nvSpPr>
+          <p:cNvPr id="182" name="Database COnnection…"/>
+          <p:cNvSpPr txBox="1"/>
+          <p:nvPr/>
+        </p:nvSpPr>
+        <p:spPr>
+          <a:xfrm>
+            <a:off x="457200" y="4102100"/>
+            <a:ext cx="8229600" cy="2044700"/>
+          </a:xfrm>
+          <a:prstGeom prst="rect">
+            <a:avLst/>
+          </a:prstGeom>
+          <a:ln w="12700">
+            <a:miter lim="400000"/>
+          </a:ln>
+          <a:extLst>
+            <a:ext uri="{C572A759-6A51-4108-AA02-DFA0A04FC94B}">
+              <ma14:wrappingTextBoxFlag xmlns:ma14="http://schemas.microsoft.com/office/mac/drawingml/2011/main" val="1"/>
+            </a:ext>
+          </a:extLst>
+        </p:spPr>
+        <p:txBody>
+          <a:bodyPr lIns="45699" tIns="45699" rIns="45699" bIns="45699" anchor="ctr">
+            <a:normAutofit fontScale="100000" lnSpcReduction="0"/>
+          </a:bodyPr>
+          <a:lstStyle/>
+          <a:p>
+            <a:pPr marL="210552" indent="-210552" algn="just">
+              <a:spcBef>
+                <a:spcPts val="300"/>
+              </a:spcBef>
+              <a:buSzPct val="100000"/>
+              <a:buChar char="•"/>
+              <a:defRPr sz="2100">
+                <a:latin typeface="Cambria"/>
+                <a:ea typeface="Cambria"/>
+                <a:cs typeface="Cambria"/>
+                <a:sym typeface="Cambria"/>
+              </a:defRPr>
+            </a:pPr>
+            <a:r>
+              <a:t>Database COnnection</a:t>
+            </a:r>
+          </a:p>
+          <a:p>
+            <a:pPr marL="210552" indent="-210552" algn="just">
+              <a:spcBef>
+                <a:spcPts val="300"/>
+              </a:spcBef>
+              <a:buSzPct val="100000"/>
+              <a:buChar char="•"/>
+              <a:defRPr sz="2100">
+                <a:latin typeface="Cambria"/>
+                <a:ea typeface="Cambria"/>
+                <a:cs typeface="Cambria"/>
+                <a:sym typeface="Cambria"/>
+              </a:defRPr>
+            </a:pPr>
+            <a:r>
+              <a:t>IoT Model (Coding Part)</a:t>
+            </a:r>
+          </a:p>
+          <a:p>
+            <a:pPr marL="210552" indent="-210552" algn="just">
+              <a:spcBef>
+                <a:spcPts val="300"/>
+              </a:spcBef>
+              <a:buSzPct val="100000"/>
+              <a:buChar char="•"/>
+              <a:defRPr sz="2100">
+                <a:latin typeface="Cambria"/>
+                <a:ea typeface="Cambria"/>
+                <a:cs typeface="Cambria"/>
+                <a:sym typeface="Cambria"/>
+              </a:defRPr>
+            </a:pPr>
+            <a:r>
+              <a:t>Integration of the different components</a:t>
+            </a:r>
           </a:p>
         </p:txBody>
       </p:sp>
@@ -4019,7 +4183,7 @@
       </p:grpSpPr>
       <p:sp>
         <p:nvSpPr>
-          <p:cNvPr id="182" name="Google Shape;104;p2"/>
+          <p:cNvPr id="184" name="Google Shape;104;p2"/>
           <p:cNvSpPr txBox="1"/>
           <p:nvPr/>
         </p:nvSpPr>
@@ -4067,7 +4231,7 @@
       </p:sp>
       <p:sp>
         <p:nvSpPr>
-          <p:cNvPr id="183" name="Google Shape;102;p2"/>
+          <p:cNvPr id="185" name="Google Shape;102;p2"/>
           <p:cNvSpPr txBox="1"/>
           <p:nvPr>
             <p:ph type="title"/>
@@ -4104,7 +4268,7 @@
       </p:sp>
       <p:sp>
         <p:nvSpPr>
-          <p:cNvPr id="184" name="Google Shape;103;p2"/>
+          <p:cNvPr id="186" name="Google Shape;103;p2"/>
           <p:cNvSpPr txBox="1"/>
           <p:nvPr/>
         </p:nvSpPr>
@@ -4152,7 +4316,7 @@
       </p:sp>
       <p:sp>
         <p:nvSpPr>
-          <p:cNvPr id="185" name="Google Shape;105;p2"/>
+          <p:cNvPr id="187" name="Google Shape;105;p2"/>
           <p:cNvSpPr txBox="1"/>
           <p:nvPr>
             <p:ph type="sldNum" sz="quarter" idx="2"/>
@@ -4191,7 +4355,7 @@
       </p:sp>
       <p:sp>
         <p:nvSpPr>
-          <p:cNvPr id="186" name="For the Smart trolley to read the RFID cards in the items and automatically add it to the customer's bill. At the end all the customer has to do is pay and take delivery of the items.…"/>
+          <p:cNvPr id="188" name="For the Smart trolley to read the RFID cards in the items and automatically add it to the customer's bill. At the end all the customer has to do is pay and take delivery of the items.…"/>
           <p:cNvSpPr txBox="1"/>
           <p:nvPr>
             <p:ph type="body" idx="1"/>
@@ -4313,7 +4477,7 @@
       </p:grpSpPr>
       <p:sp>
         <p:nvSpPr>
-          <p:cNvPr id="188" name="Google Shape;104;p2"/>
+          <p:cNvPr id="190" name="Google Shape;104;p2"/>
           <p:cNvSpPr txBox="1"/>
           <p:nvPr/>
         </p:nvSpPr>
@@ -4361,7 +4525,7 @@
       </p:sp>
       <p:sp>
         <p:nvSpPr>
-          <p:cNvPr id="189" name="Google Shape;102;p2"/>
+          <p:cNvPr id="191" name="Google Shape;102;p2"/>
           <p:cNvSpPr txBox="1"/>
           <p:nvPr>
             <p:ph type="title"/>
@@ -4398,7 +4562,7 @@
       </p:sp>
       <p:sp>
         <p:nvSpPr>
-          <p:cNvPr id="190" name="Google Shape;103;p2"/>
+          <p:cNvPr id="192" name="Google Shape;103;p2"/>
           <p:cNvSpPr txBox="1"/>
           <p:nvPr/>
         </p:nvSpPr>
@@ -4446,7 +4610,7 @@
       </p:sp>
       <p:sp>
         <p:nvSpPr>
-          <p:cNvPr id="191" name="Google Shape;105;p2"/>
+          <p:cNvPr id="193" name="Google Shape;105;p2"/>
           <p:cNvSpPr txBox="1"/>
           <p:nvPr>
             <p:ph type="sldNum" sz="quarter" idx="2"/>
@@ -4485,7 +4649,7 @@
       </p:sp>
       <p:sp>
         <p:nvSpPr>
-          <p:cNvPr id="192" name="Construct an IoT-based Scanner system that uses RFID scanner to scan the items.…"/>
+          <p:cNvPr id="194" name="Construct an IoT-based Scanner system that uses RFID scanner to scan the items.…"/>
           <p:cNvSpPr txBox="1"/>
           <p:nvPr>
             <p:ph type="body" idx="1"/>
@@ -4678,7 +4842,7 @@
       </p:grpSpPr>
       <p:sp>
         <p:nvSpPr>
-          <p:cNvPr id="194" name="Google Shape;104;p2"/>
+          <p:cNvPr id="196" name="Google Shape;104;p2"/>
           <p:cNvSpPr txBox="1"/>
           <p:nvPr/>
         </p:nvSpPr>
@@ -4726,7 +4890,7 @@
       </p:sp>
       <p:sp>
         <p:nvSpPr>
-          <p:cNvPr id="195" name="Google Shape;102;p2"/>
+          <p:cNvPr id="197" name="Google Shape;102;p2"/>
           <p:cNvSpPr txBox="1"/>
           <p:nvPr>
             <p:ph type="title"/>
@@ -4763,7 +4927,7 @@
       </p:sp>
       <p:sp>
         <p:nvSpPr>
-          <p:cNvPr id="196" name="Google Shape;103;p2"/>
+          <p:cNvPr id="198" name="Google Shape;103;p2"/>
           <p:cNvSpPr txBox="1"/>
           <p:nvPr/>
         </p:nvSpPr>
@@ -4811,7 +4975,7 @@
       </p:sp>
       <p:sp>
         <p:nvSpPr>
-          <p:cNvPr id="197" name="Google Shape;105;p2"/>
+          <p:cNvPr id="199" name="Google Shape;105;p2"/>
           <p:cNvSpPr txBox="1"/>
           <p:nvPr>
             <p:ph type="sldNum" sz="quarter" idx="2"/>
@@ -4850,7 +5014,7 @@
       </p:sp>
       <p:sp>
         <p:nvSpPr>
-          <p:cNvPr id="198" name="Double-click to edit"/>
+          <p:cNvPr id="200" name="Double-click to edit"/>
           <p:cNvSpPr txBox="1"/>
           <p:nvPr>
             <p:ph type="body" idx="1"/>
@@ -5390,7 +5554,7 @@
           <a:bodyPr/>
           <a:lstStyle/>
           <a:p>
-            <a:pPr marL="0" indent="0" algn="ctr" defTabSz="877823">
+            <a:pPr marL="0" indent="0" algn="ctr" defTabSz="822959">
               <a:spcBef>
                 <a:spcPts val="200"/>
               </a:spcBef>
@@ -5398,7 +5562,7 @@
               <a:buSzTx/>
               <a:buFontTx/>
               <a:buNone/>
-              <a:defRPr b="1" sz="2400">
+              <a:defRPr b="1" sz="2070">
                 <a:latin typeface="Cambria"/>
                 <a:ea typeface="Cambria"/>
                 <a:cs typeface="Cambria"/>
@@ -5410,7 +5574,7 @@
             </a:r>
           </a:p>
           <a:p>
-            <a:pPr marL="0" indent="0" algn="ctr" defTabSz="877823">
+            <a:pPr marL="0" indent="0" algn="ctr" defTabSz="822959">
               <a:lnSpc>
                 <a:spcPct val="40000"/>
               </a:lnSpc>
@@ -5421,11 +5585,16 @@
               <a:buSzTx/>
               <a:buFontTx/>
               <a:buNone/>
-              <a:defRPr b="1" sz="2400"/>
+              <a:defRPr b="1" sz="2250">
+                <a:latin typeface="Cambria"/>
+                <a:ea typeface="Cambria"/>
+                <a:cs typeface="Cambria"/>
+                <a:sym typeface="Cambria"/>
+              </a:defRPr>
             </a:pPr>
           </a:p>
           <a:p>
-            <a:pPr marL="0" indent="0" algn="just" defTabSz="877823">
+            <a:pPr marL="0" indent="0" algn="ctr" defTabSz="822959">
               <a:spcBef>
                 <a:spcPts val="200"/>
               </a:spcBef>
@@ -5433,7 +5602,42 @@
               <a:buSzTx/>
               <a:buFontTx/>
               <a:buNone/>
-              <a:defRPr sz="2016">
+              <a:defRPr b="1" sz="1350">
+                <a:latin typeface="Cambria"/>
+                <a:ea typeface="Cambria"/>
+                <a:cs typeface="Cambria"/>
+                <a:sym typeface="Cambria"/>
+              </a:defRPr>
+            </a:pPr>
+            <a:r>
+              <a:t>Presented on Second International Conference on Inventive Research in Computing Applications (ICIRCA - 2020)</a:t>
+            </a:r>
+          </a:p>
+          <a:p>
+            <a:pPr marL="0" indent="0" algn="ctr" defTabSz="822959">
+              <a:lnSpc>
+                <a:spcPct val="40000"/>
+              </a:lnSpc>
+              <a:spcBef>
+                <a:spcPts val="200"/>
+              </a:spcBef>
+              <a:buClrTx/>
+              <a:buSzTx/>
+              <a:buFontTx/>
+              <a:buNone/>
+              <a:defRPr b="1" sz="2250"/>
+            </a:pPr>
+          </a:p>
+          <a:p>
+            <a:pPr marL="0" indent="0" algn="just" defTabSz="822959">
+              <a:spcBef>
+                <a:spcPts val="200"/>
+              </a:spcBef>
+              <a:buClrTx/>
+              <a:buSzTx/>
+              <a:buFontTx/>
+              <a:buNone/>
+              <a:defRPr sz="1890">
                 <a:latin typeface="Cambria"/>
                 <a:ea typeface="Cambria"/>
                 <a:cs typeface="Cambria"/>
@@ -5665,7 +5869,7 @@
           <a:bodyPr anchor="ctr"/>
           <a:lstStyle/>
           <a:p>
-            <a:pPr marL="0" indent="0" algn="ctr" defTabSz="868680">
+            <a:pPr marL="0" indent="0" algn="ctr" defTabSz="822959">
               <a:lnSpc>
                 <a:spcPct val="70000"/>
               </a:lnSpc>
@@ -5676,7 +5880,7 @@
               <a:buSzTx/>
               <a:buFontTx/>
               <a:buNone/>
-              <a:defRPr b="1" sz="2375">
+              <a:defRPr b="1" sz="2070">
                 <a:latin typeface="Cambria"/>
                 <a:ea typeface="Cambria"/>
                 <a:cs typeface="Cambria"/>
@@ -5688,7 +5892,7 @@
             </a:r>
           </a:p>
           <a:p>
-            <a:pPr marL="0" indent="0" algn="ctr" defTabSz="868680">
+            <a:pPr marL="0" indent="0" algn="ctr" defTabSz="822959">
               <a:lnSpc>
                 <a:spcPct val="40000"/>
               </a:lnSpc>
@@ -5699,11 +5903,16 @@
               <a:buSzTx/>
               <a:buFontTx/>
               <a:buNone/>
-              <a:defRPr b="1" sz="2375"/>
+              <a:defRPr b="1" sz="2250">
+                <a:latin typeface="Cambria"/>
+                <a:ea typeface="Cambria"/>
+                <a:cs typeface="Cambria"/>
+                <a:sym typeface="Cambria"/>
+              </a:defRPr>
             </a:pPr>
           </a:p>
           <a:p>
-            <a:pPr marL="0" indent="0" algn="just" defTabSz="868680">
+            <a:pPr marL="0" indent="0" algn="ctr" defTabSz="822959">
               <a:spcBef>
                 <a:spcPts val="200"/>
               </a:spcBef>
@@ -5711,7 +5920,47 @@
               <a:buSzTx/>
               <a:buFontTx/>
               <a:buNone/>
-              <a:defRPr sz="1994">
+              <a:defRPr b="1" sz="1350">
+                <a:latin typeface="Cambria"/>
+                <a:ea typeface="Cambria"/>
+                <a:cs typeface="Cambria"/>
+                <a:sym typeface="Cambria"/>
+              </a:defRPr>
+            </a:pPr>
+            <a:r>
+              <a:t>Presented on Fifth International Conference on Computing Methodologies and Communication (ICCMC - 2021)</a:t>
+            </a:r>
+          </a:p>
+          <a:p>
+            <a:pPr marL="0" indent="0" algn="ctr" defTabSz="822959">
+              <a:lnSpc>
+                <a:spcPct val="40000"/>
+              </a:lnSpc>
+              <a:spcBef>
+                <a:spcPts val="200"/>
+              </a:spcBef>
+              <a:buClrTx/>
+              <a:buSzTx/>
+              <a:buFontTx/>
+              <a:buNone/>
+              <a:defRPr b="1" sz="1350">
+                <a:latin typeface="Cambria"/>
+                <a:ea typeface="Cambria"/>
+                <a:cs typeface="Cambria"/>
+                <a:sym typeface="Cambria"/>
+              </a:defRPr>
+            </a:pPr>
+          </a:p>
+          <a:p>
+            <a:pPr marL="0" indent="0" algn="just" defTabSz="822959">
+              <a:spcBef>
+                <a:spcPts val="200"/>
+              </a:spcBef>
+              <a:buClrTx/>
+              <a:buSzTx/>
+              <a:buFontTx/>
+              <a:buNone/>
+              <a:defRPr sz="1890">
                 <a:latin typeface="Cambria"/>
                 <a:ea typeface="Cambria"/>
                 <a:cs typeface="Cambria"/>
@@ -5951,7 +6200,7 @@
               <a:buSzTx/>
               <a:buFontTx/>
               <a:buNone/>
-              <a:defRPr b="1" sz="2425">
+              <a:defRPr b="1" sz="2231">
                 <a:latin typeface="Cambria"/>
                 <a:ea typeface="Cambria"/>
                 <a:cs typeface="Cambria"/>
@@ -5983,6 +6232,53 @@
             </a:pPr>
           </a:p>
           <a:p>
+            <a:pPr marL="0" indent="0" algn="ctr" defTabSz="886968">
+              <a:spcBef>
+                <a:spcPts val="200"/>
+              </a:spcBef>
+              <a:buClrTx/>
+              <a:buSzTx/>
+              <a:buFontTx/>
+              <a:buNone/>
+              <a:defRPr b="1" sz="1455">
+                <a:latin typeface="Cambria"/>
+                <a:ea typeface="Cambria"/>
+                <a:cs typeface="Cambria"/>
+                <a:sym typeface="Cambria"/>
+              </a:defRPr>
+            </a:pPr>
+            <a:r>
+              <a:t>Presented by 2020 19</a:t>
+            </a:r>
+            <a:r>
+              <a:rPr baseline="31999"/>
+              <a:t>th</a:t>
+            </a:r>
+            <a:r>
+              <a:t> IEEE International Conference on Machine Learning and Applications (ICMLA)</a:t>
+            </a:r>
+          </a:p>
+          <a:p>
+            <a:pPr marL="0" indent="0" algn="ctr" defTabSz="886968">
+              <a:lnSpc>
+                <a:spcPct val="40000"/>
+              </a:lnSpc>
+              <a:spcBef>
+                <a:spcPts val="200"/>
+              </a:spcBef>
+              <a:buClrTx/>
+              <a:buSzTx/>
+              <a:buFontTx/>
+              <a:buNone/>
+              <a:defRPr b="1" sz="1455">
+                <a:latin typeface="Cambria"/>
+                <a:ea typeface="Cambria"/>
+                <a:cs typeface="Cambria"/>
+                <a:sym typeface="Cambria"/>
+              </a:defRPr>
+            </a:pPr>
+          </a:p>
+          <a:p>
             <a:pPr marL="0" indent="0" algn="just" defTabSz="886968">
               <a:spcBef>
                 <a:spcPts val="200"/>
@@ -5999,7 +6295,7 @@
               </a:defRPr>
             </a:pPr>
             <a:r>
-              <a:t>Customers who seek the services at supermarkets are subjected to inconsistencies &amp; ambiguities over choosing their desired products from a wide range of products with the closest quality. Meanwhile, supermarkets find it very difficult to satiate the customers’ demand. Therefore, proposing a method to analyze the customers’ need plays an important role in attracting new and regular customers. The purpose of this study is to formulate a product recommendation system which analyze customers’ needs and thus recommend the best products. This system recommends products to the regular customers and to the new customers as well. New customers mean obviously the customers with no purchasing history at the supermarket in question. The system referred to recommends the products to the new customers using up two method. One method recommends the most popular products while the other method solely focuses on the product description for recommendation.</a:t>
+              <a:t>Customers who seek the services at supermarkets are subjected to inconsistencies &amp; ambiguities over choosing their desired products from a wide range of products with the closest quality. Meanwhile, supermarkets find it very difficult to satiate the customers’ demand. Therefore, proposing a method to analyze the customers’ need plays an important role in attracting new and regular customers. The purpose of this study is to formulate a product recommendation system which analyze customers’ needs and thus recommend the best products. This system recommends products to the regular customers and to the new customers as well. New customers mean obviously the customers with no purchasing history at the supermarket in question. The system referred to recommends the products to the new customers using up two method. </a:t>
             </a:r>
           </a:p>
         </p:txBody>
@@ -6223,12 +6519,15 @@
           <a:bodyPr/>
           <a:lstStyle/>
           <a:p>
-            <a:pPr marL="0" indent="0" algn="ctr">
+            <a:pPr marL="0" indent="0" algn="ctr" defTabSz="886968">
+              <a:spcBef>
+                <a:spcPts val="200"/>
+              </a:spcBef>
               <a:buClrTx/>
               <a:buSzTx/>
               <a:buFontTx/>
               <a:buNone/>
-              <a:defRPr b="1" sz="2500">
+              <a:defRPr b="1" sz="2231">
                 <a:latin typeface="Cambria"/>
                 <a:ea typeface="Cambria"/>
                 <a:cs typeface="Cambria"/>
@@ -6240,12 +6539,15 @@
             </a:r>
           </a:p>
           <a:p>
-            <a:pPr marL="0" indent="0" algn="ctr">
+            <a:pPr marL="0" indent="0" algn="ctr" defTabSz="886968">
+              <a:spcBef>
+                <a:spcPts val="200"/>
+              </a:spcBef>
               <a:buClrTx/>
               <a:buSzTx/>
               <a:buFontTx/>
               <a:buNone/>
-              <a:defRPr sz="2500">
+              <a:defRPr sz="2037">
                 <a:solidFill>
                   <a:srgbClr val="A7A7A7"/>
                 </a:solidFill>
@@ -6260,15 +6562,18 @@
             </a:r>
           </a:p>
           <a:p>
-            <a:pPr marL="0" indent="0" algn="ctr">
+            <a:pPr marL="0" indent="0" algn="ctr" defTabSz="886968">
               <a:lnSpc>
                 <a:spcPct val="40000"/>
               </a:lnSpc>
+              <a:spcBef>
+                <a:spcPts val="200"/>
+              </a:spcBef>
               <a:buClrTx/>
               <a:buSzTx/>
               <a:buFontTx/>
               <a:buNone/>
-              <a:defRPr b="1" sz="2500">
+              <a:defRPr b="1" sz="2425">
                 <a:latin typeface="Cambria"/>
                 <a:ea typeface="Cambria"/>
                 <a:cs typeface="Cambria"/>
@@ -6277,12 +6582,15 @@
             </a:pPr>
           </a:p>
           <a:p>
-            <a:pPr marL="0" indent="0" algn="just">
+            <a:pPr marL="0" indent="0" algn="just" defTabSz="886968">
+              <a:spcBef>
+                <a:spcPts val="200"/>
+              </a:spcBef>
               <a:buClrTx/>
               <a:buSzTx/>
               <a:buFontTx/>
               <a:buNone/>
-              <a:defRPr sz="2100">
+              <a:defRPr sz="2037">
                 <a:latin typeface="Cambria"/>
                 <a:ea typeface="Cambria"/>
                 <a:cs typeface="Cambria"/>
@@ -6290,7 +6598,7 @@
               </a:defRPr>
             </a:pPr>
             <a:r>
-              <a:t>The system recommends the products to the regular customers using up user-based collaborative filtering, item based collaborative filtering and association rule mining. It recommends products to regular customers based on purchasing history and priority ratings given by other users who bought the products. Initially, the recommendation algorithm finds a set of customers who purchased and rated the products that overlap with the user who purchased and rated the products. The algorithm aggregates products from the customers with similar preference and eliminates the products the user has already purchased or rated. The proposed methodology improves the shopping experience of customers by recommending accurately and efficiently the products that are personalized to the need of the customers. </a:t>
+              <a:t>One method recommends the most popular products while the other method solely focuses on the product description for recommendation. The system recommends the products to the regular customers using up user-based collaborative filtering, item based collaborative filtering and association rule mining. It recommends products to regular customers based on purchasing history and priority ratings given by other users who bought the products. Initially, the recommendation algorithm finds a set of customers who purchased and rated the products that overlap with the user who purchased and rated the products. The algorithm aggregates products from the customers with similar preference and eliminates the products the user has already purchased or rated. The proposed methodology improves the shopping experience of customers by recommending accurately and efficiently the products that are personalized to the need of the customers. </a:t>
             </a:r>
           </a:p>
         </p:txBody>

</xml_diff>